<commit_message>
bchwtz published a site update
</commit_message>
<xml_diff>
--- a/data/bchwtz-postermaster.pptx
+++ b/data/bchwtz-postermaster.pptx
@@ -104,6 +104,11 @@
       </a:defRPr>
     </a:lvl9pPr>
   </p:defaultTextStyle>
+  <p:extLst>
+    <p:ext uri="{EFAFB233-063F-42B5-8137-9DF3F51BA10A}">
+      <p15:sldGuideLst xmlns:p15="http://schemas.microsoft.com/office/powerpoint/2012/main"/>
+    </p:ext>
+  </p:extLst>
 </p:presentation>
 </file>
 
@@ -5694,7 +5699,7 @@
                             <a:rPr lang="de-DE" b="0" i="1" smtClean="0">
                               <a:latin typeface="Cambria Math" panose="02040503050406030204" pitchFamily="18" charset="0"/>
                             </a:rPr>
-                            <m:t>2</m:t>
+                            <m:t>−1</m:t>
                           </m:r>
                         </m:sup>
                       </m:sSup>
@@ -8991,14 +8996,14 @@
           <a:effectLst/>
           <a:extLst>
             <a:ext uri="{909E8E84-426E-40dd-AFC4-6F175D3DCCD1}">
-              <a14:hiddenFill xmlns:a14="http://schemas.microsoft.com/office/drawing/2010/main" xmlns="">
+              <a14:hiddenFill xmlns="" xmlns:a14="http://schemas.microsoft.com/office/drawing/2010/main">
                 <a:solidFill>
                   <a:schemeClr val="accent2"/>
                 </a:solidFill>
               </a14:hiddenFill>
             </a:ext>
             <a:ext uri="{AF507438-7753-43e0-B8FC-AC1667EBCBE1}">
-              <a14:hiddenEffects xmlns:a14="http://schemas.microsoft.com/office/drawing/2010/main" xmlns="">
+              <a14:hiddenEffects xmlns="" xmlns:a14="http://schemas.microsoft.com/office/drawing/2010/main">
                 <a:effectLst>
                   <a:outerShdw blurRad="63500" dist="35921" dir="2700000" algn="ctr" rotWithShape="0">
                     <a:schemeClr val="bg2"/>

</xml_diff>